<commit_message>
minor changes for ir2
</commit_message>
<xml_diff>
--- a/docs/IR2.pptx
+++ b/docs/IR2.pptx
@@ -360,7 +360,7 @@
           <a:p>
             <a:fld id="{4B07EEA8-FB7C-4269-ACE5-D30FA3B236CF}" type="slidenum">
               <a:rPr lang="de-AT" smtClean="0"/>
-              <a:t>‹Nr.›</a:t>
+              <a:t>‹#›</a:t>
             </a:fld>
             <a:endParaRPr lang="de-AT"/>
           </a:p>
@@ -1880,7 +1880,7 @@
             <a:fld id="{D57F1E4F-1CFF-5643-939E-217C01CDF565}" type="slidenum">
               <a:rPr lang="en-US" dirty="0"/>
               <a:pPr/>
-              <a:t>‹Nr.›</a:t>
+              <a:t>‹#›</a:t>
             </a:fld>
             <a:endParaRPr lang="en-US" dirty="0"/>
           </a:p>
@@ -2168,7 +2168,7 @@
             <a:fld id="{D57F1E4F-1CFF-5643-939E-217C01CDF565}" type="slidenum">
               <a:rPr lang="en-US" dirty="0"/>
               <a:pPr/>
-              <a:t>‹Nr.›</a:t>
+              <a:t>‹#›</a:t>
             </a:fld>
             <a:endParaRPr lang="en-US" dirty="0"/>
           </a:p>
@@ -2413,7 +2413,7 @@
             <a:fld id="{D57F1E4F-1CFF-5643-939E-217C01CDF565}" type="slidenum">
               <a:rPr lang="en-US" dirty="0"/>
               <a:pPr/>
-              <a:t>‹Nr.›</a:t>
+              <a:t>‹#›</a:t>
             </a:fld>
             <a:endParaRPr lang="en-US" dirty="0"/>
           </a:p>
@@ -2950,7 +2950,7 @@
             <a:fld id="{D57F1E4F-1CFF-5643-939E-217C01CDF565}" type="slidenum">
               <a:rPr lang="en-US" dirty="0"/>
               <a:pPr/>
-              <a:t>‹Nr.›</a:t>
+              <a:t>‹#›</a:t>
             </a:fld>
             <a:endParaRPr lang="en-US" dirty="0"/>
           </a:p>
@@ -3195,7 +3195,7 @@
             <a:fld id="{D57F1E4F-1CFF-5643-939E-217C01CDF565}" type="slidenum">
               <a:rPr lang="en-US" dirty="0"/>
               <a:pPr/>
-              <a:t>‹Nr.›</a:t>
+              <a:t>‹#›</a:t>
             </a:fld>
             <a:endParaRPr lang="en-US" dirty="0"/>
           </a:p>
@@ -3724,7 +3724,7 @@
             <a:fld id="{D57F1E4F-1CFF-5643-939E-217C01CDF565}" type="slidenum">
               <a:rPr lang="en-US" dirty="0"/>
               <a:pPr/>
-              <a:t>‹Nr.›</a:t>
+              <a:t>‹#›</a:t>
             </a:fld>
             <a:endParaRPr lang="en-US" dirty="0"/>
           </a:p>
@@ -4018,7 +4018,7 @@
             <a:fld id="{D57F1E4F-1CFF-5643-939E-217C01CDF565}" type="slidenum">
               <a:rPr lang="en-US" dirty="0"/>
               <a:pPr/>
-              <a:t>‹Nr.›</a:t>
+              <a:t>‹#›</a:t>
             </a:fld>
             <a:endParaRPr lang="en-US" dirty="0"/>
           </a:p>
@@ -4189,7 +4189,7 @@
             <a:fld id="{D57F1E4F-1CFF-5643-939E-217C01CDF565}" type="slidenum">
               <a:rPr lang="en-US" dirty="0"/>
               <a:pPr/>
-              <a:t>‹Nr.›</a:t>
+              <a:t>‹#›</a:t>
             </a:fld>
             <a:endParaRPr lang="en-US" dirty="0"/>
           </a:p>
@@ -4366,7 +4366,7 @@
             <a:fld id="{D57F1E4F-1CFF-5643-939E-217C01CDF565}" type="slidenum">
               <a:rPr lang="en-US" dirty="0"/>
               <a:pPr/>
-              <a:t>‹Nr.›</a:t>
+              <a:t>‹#›</a:t>
             </a:fld>
             <a:endParaRPr lang="en-US" dirty="0"/>
           </a:p>
@@ -4538,7 +4538,7 @@
             <a:fld id="{D57F1E4F-1CFF-5643-939E-217C01CDF565}" type="slidenum">
               <a:rPr lang="en-US" dirty="0"/>
               <a:pPr/>
-              <a:t>‹Nr.›</a:t>
+              <a:t>‹#›</a:t>
             </a:fld>
             <a:endParaRPr lang="en-US" dirty="0"/>
           </a:p>
@@ -4781,7 +4781,7 @@
             <a:fld id="{D57F1E4F-1CFF-5643-939E-217C01CDF565}" type="slidenum">
               <a:rPr lang="en-US" dirty="0"/>
               <a:pPr/>
-              <a:t>‹Nr.›</a:t>
+              <a:t>‹#›</a:t>
             </a:fld>
             <a:endParaRPr lang="en-US" dirty="0"/>
           </a:p>
@@ -5075,7 +5075,7 @@
             <a:fld id="{D57F1E4F-1CFF-5643-939E-217C01CDF565}" type="slidenum">
               <a:rPr lang="en-US" dirty="0"/>
               <a:pPr/>
-              <a:t>‹Nr.›</a:t>
+              <a:t>‹#›</a:t>
             </a:fld>
             <a:endParaRPr lang="en-US" dirty="0"/>
           </a:p>
@@ -5514,7 +5514,7 @@
             <a:fld id="{D57F1E4F-1CFF-5643-939E-217C01CDF565}" type="slidenum">
               <a:rPr lang="en-US" dirty="0"/>
               <a:pPr/>
-              <a:t>‹Nr.›</a:t>
+              <a:t>‹#›</a:t>
             </a:fld>
             <a:endParaRPr lang="en-US" dirty="0"/>
           </a:p>
@@ -5629,7 +5629,7 @@
             <a:fld id="{D57F1E4F-1CFF-5643-939E-217C01CDF565}" type="slidenum">
               <a:rPr lang="en-US" dirty="0"/>
               <a:pPr/>
-              <a:t>‹Nr.›</a:t>
+              <a:t>‹#›</a:t>
             </a:fld>
             <a:endParaRPr lang="en-US" dirty="0"/>
           </a:p>
@@ -5721,7 +5721,7 @@
             <a:fld id="{D57F1E4F-1CFF-5643-939E-217C01CDF565}" type="slidenum">
               <a:rPr lang="en-US" dirty="0"/>
               <a:pPr/>
-              <a:t>‹Nr.›</a:t>
+              <a:t>‹#›</a:t>
             </a:fld>
             <a:endParaRPr lang="en-US" dirty="0"/>
           </a:p>
@@ -6001,7 +6001,7 @@
             <a:fld id="{D57F1E4F-1CFF-5643-939E-217C01CDF565}" type="slidenum">
               <a:rPr lang="en-US" dirty="0"/>
               <a:pPr/>
-              <a:t>‹Nr.›</a:t>
+              <a:t>‹#›</a:t>
             </a:fld>
             <a:endParaRPr lang="en-US" dirty="0"/>
           </a:p>
@@ -6289,7 +6289,7 @@
             <a:fld id="{D57F1E4F-1CFF-5643-939E-217C01CDF565}" type="slidenum">
               <a:rPr lang="en-US" dirty="0"/>
               <a:pPr/>
-              <a:t>‹Nr.›</a:t>
+              <a:t>‹#›</a:t>
             </a:fld>
             <a:endParaRPr lang="en-US" dirty="0"/>
           </a:p>
@@ -6852,7 +6852,7 @@
             <a:fld id="{D57F1E4F-1CFF-5643-939E-217C01CDF565}" type="slidenum">
               <a:rPr lang="en-US" dirty="0"/>
               <a:pPr/>
-              <a:t>‹Nr.›</a:t>
+              <a:t>‹#›</a:t>
             </a:fld>
             <a:endParaRPr lang="en-US" dirty="0"/>
           </a:p>
@@ -7333,11 +7333,7 @@
             </a:br>
             <a:r>
               <a:rPr lang="en-AU" dirty="0" smtClean="0"/>
-              <a:t>I</a:t>
-            </a:r>
-            <a:r>
-              <a:rPr lang="en-AU" dirty="0" smtClean="0"/>
-              <a:t>R2</a:t>
+              <a:t>IR2</a:t>
             </a:r>
             <a:endParaRPr lang="en-AU" dirty="0"/>
           </a:p>
@@ -7371,11 +7367,7 @@
             </a:br>
             <a:r>
               <a:rPr lang="de-AT" dirty="0" smtClean="0"/>
-              <a:t>Group </a:t>
-            </a:r>
-            <a:r>
-              <a:rPr lang="de-AT" dirty="0" smtClean="0"/>
-              <a:t>10</a:t>
+              <a:t>Group 10</a:t>
             </a:r>
             <a:endParaRPr lang="de-AT" dirty="0"/>
           </a:p>
@@ -8146,14 +8138,14 @@
             <p:ph idx="1"/>
             <p:extLst>
               <p:ext uri="{D42A27DB-BD31-4B8C-83A1-F6EECF244321}">
-                <p14:modId xmlns:p14="http://schemas.microsoft.com/office/powerpoint/2010/main" val="4031382958"/>
+                <p14:modId xmlns:p14="http://schemas.microsoft.com/office/powerpoint/2010/main" val="518962452"/>
               </p:ext>
             </p:extLst>
           </p:nvPr>
         </p:nvGraphicFramePr>
         <p:xfrm>
-          <a:off x="3714373" y="833120"/>
-          <a:ext cx="6679142" cy="5191760"/>
+          <a:off x="3738436" y="652640"/>
+          <a:ext cx="6679142" cy="5562600"/>
         </p:xfrm>
         <a:graphic>
           <a:graphicData uri="http://schemas.openxmlformats.org/drawingml/2006/table">
@@ -8260,32 +8252,6 @@
                       <a:r>
                         <a:rPr lang="en-GB" noProof="0" dirty="0" err="1" smtClean="0"/>
                         <a:t>WireTap</a:t>
-                      </a:r>
-                      <a:endParaRPr lang="en-GB" noProof="0" dirty="0"/>
-                    </a:p>
-                  </a:txBody>
-                  <a:tcPr/>
-                </a:tc>
-                <a:tc>
-                  <a:txBody>
-                    <a:bodyPr/>
-                    <a:lstStyle/>
-                    <a:p>
-                      <a:endParaRPr lang="en-GB" noProof="0" dirty="0"/>
-                    </a:p>
-                  </a:txBody>
-                  <a:tcPr/>
-                </a:tc>
-              </a:tr>
-              <a:tr h="370840">
-                <a:tc>
-                  <a:txBody>
-                    <a:bodyPr/>
-                    <a:lstStyle/>
-                    <a:p>
-                      <a:r>
-                        <a:rPr lang="en-GB" noProof="0" dirty="0" smtClean="0"/>
-                        <a:t>Publish Subscribe</a:t>
                       </a:r>
                       <a:endParaRPr lang="en-GB" noProof="0" dirty="0"/>
                     </a:p>
@@ -8549,34 +8515,62 @@
                   <a:tcPr/>
                 </a:tc>
               </a:tr>
+              <a:tr h="370840">
+                <a:tc>
+                  <a:txBody>
+                    <a:bodyPr/>
+                    <a:lstStyle/>
+                    <a:p>
+                      <a:r>
+                        <a:rPr lang="en-GB" noProof="0" dirty="0" smtClean="0"/>
+                        <a:t>Multicast</a:t>
+                      </a:r>
+                      <a:endParaRPr lang="en-GB" noProof="0" dirty="0"/>
+                    </a:p>
+                  </a:txBody>
+                  <a:tcPr/>
+                </a:tc>
+                <a:tc>
+                  <a:txBody>
+                    <a:bodyPr/>
+                    <a:lstStyle/>
+                    <a:p>
+                      <a:endParaRPr lang="en-GB" noProof="0" dirty="0"/>
+                    </a:p>
+                  </a:txBody>
+                  <a:tcPr/>
+                </a:tc>
+              </a:tr>
+              <a:tr h="370840">
+                <a:tc>
+                  <a:txBody>
+                    <a:bodyPr/>
+                    <a:lstStyle/>
+                    <a:p>
+                      <a:r>
+                        <a:rPr lang="en-GB" noProof="0" dirty="0" smtClean="0"/>
+                        <a:t>…</a:t>
+                      </a:r>
+                      <a:endParaRPr lang="en-GB" noProof="0" dirty="0"/>
+                    </a:p>
+                  </a:txBody>
+                  <a:tcPr/>
+                </a:tc>
+                <a:tc>
+                  <a:txBody>
+                    <a:bodyPr/>
+                    <a:lstStyle/>
+                    <a:p>
+                      <a:endParaRPr lang="en-GB" noProof="0" dirty="0"/>
+                    </a:p>
+                  </a:txBody>
+                  <a:tcPr/>
+                </a:tc>
+              </a:tr>
             </a:tbl>
           </a:graphicData>
         </a:graphic>
       </p:graphicFrame>
-      <p:pic>
-        <p:nvPicPr>
-          <p:cNvPr id="7" name="Grafik 6"/>
-          <p:cNvPicPr>
-            <a:picLocks noChangeAspect="1"/>
-          </p:cNvPicPr>
-          <p:nvPr/>
-        </p:nvPicPr>
-        <p:blipFill>
-          <a:blip r:embed="rId3"/>
-          <a:stretch>
-            <a:fillRect/>
-          </a:stretch>
-        </p:blipFill>
-        <p:spPr>
-          <a:xfrm>
-            <a:off x="8469054" y="2380709"/>
-            <a:ext cx="248400" cy="248400"/>
-          </a:xfrm>
-          <a:prstGeom prst="rect">
-            <a:avLst/>
-          </a:prstGeom>
-        </p:spPr>
-      </p:pic>
       <p:pic>
         <p:nvPicPr>
           <p:cNvPr id="21" name="Picture 2" descr="http://vitamin-c.vitamin-power.eu/assets/images/Gruener-Haken.jpg"/>
@@ -8586,7 +8580,7 @@
           <p:nvPr/>
         </p:nvPicPr>
         <p:blipFill>
-          <a:blip r:embed="rId4">
+          <a:blip r:embed="rId3">
             <a:extLst>
               <a:ext uri="{28A0092B-C50C-407E-A947-70E740481C1C}">
                 <a14:useLocalDpi xmlns:a14="http://schemas.microsoft.com/office/drawing/2010/main" val="0"/>
@@ -8600,7 +8594,7 @@
         </p:blipFill>
         <p:spPr bwMode="auto">
           <a:xfrm>
-            <a:off x="8468131" y="2753841"/>
+            <a:off x="8492194" y="2585393"/>
             <a:ext cx="246554" cy="246554"/>
           </a:xfrm>
           <a:prstGeom prst="rect">
@@ -8627,7 +8621,7 @@
           <p:nvPr/>
         </p:nvPicPr>
         <p:blipFill>
-          <a:blip r:embed="rId4">
+          <a:blip r:embed="rId3">
             <a:extLst>
               <a:ext uri="{28A0092B-C50C-407E-A947-70E740481C1C}">
                 <a14:useLocalDpi xmlns:a14="http://schemas.microsoft.com/office/drawing/2010/main" val="0"/>
@@ -8641,7 +8635,7 @@
         </p:blipFill>
         <p:spPr bwMode="auto">
           <a:xfrm>
-            <a:off x="8468131" y="2023183"/>
+            <a:off x="8492194" y="1854735"/>
             <a:ext cx="246554" cy="246554"/>
           </a:xfrm>
           <a:prstGeom prst="rect">
@@ -8668,7 +8662,7 @@
           <p:nvPr/>
         </p:nvPicPr>
         <p:blipFill>
-          <a:blip r:embed="rId4">
+          <a:blip r:embed="rId3">
             <a:extLst>
               <a:ext uri="{28A0092B-C50C-407E-A947-70E740481C1C}">
                 <a14:useLocalDpi xmlns:a14="http://schemas.microsoft.com/office/drawing/2010/main" val="0"/>
@@ -8682,7 +8676,7 @@
         </p:blipFill>
         <p:spPr bwMode="auto">
           <a:xfrm>
-            <a:off x="8468131" y="1610186"/>
+            <a:off x="8492194" y="1441738"/>
             <a:ext cx="246554" cy="246554"/>
           </a:xfrm>
           <a:prstGeom prst="rect">
@@ -8709,7 +8703,7 @@
           <p:nvPr/>
         </p:nvPicPr>
         <p:blipFill>
-          <a:blip r:embed="rId4">
+          <a:blip r:embed="rId3">
             <a:extLst>
               <a:ext uri="{28A0092B-C50C-407E-A947-70E740481C1C}">
                 <a14:useLocalDpi xmlns:a14="http://schemas.microsoft.com/office/drawing/2010/main" val="0"/>
@@ -8723,7 +8717,7 @@
         </p:blipFill>
         <p:spPr bwMode="auto">
           <a:xfrm>
-            <a:off x="8468131" y="4609140"/>
+            <a:off x="8492194" y="4440692"/>
             <a:ext cx="246554" cy="246554"/>
           </a:xfrm>
           <a:prstGeom prst="rect">
@@ -8750,7 +8744,7 @@
           <p:nvPr/>
         </p:nvPicPr>
         <p:blipFill>
-          <a:blip r:embed="rId4">
+          <a:blip r:embed="rId3">
             <a:extLst>
               <a:ext uri="{28A0092B-C50C-407E-A947-70E740481C1C}">
                 <a14:useLocalDpi xmlns:a14="http://schemas.microsoft.com/office/drawing/2010/main" val="0"/>
@@ -8764,7 +8758,7 @@
         </p:blipFill>
         <p:spPr bwMode="auto">
           <a:xfrm>
-            <a:off x="8448719" y="5336902"/>
+            <a:off x="8472782" y="5168454"/>
             <a:ext cx="246554" cy="246554"/>
           </a:xfrm>
           <a:prstGeom prst="rect">
@@ -8791,7 +8785,7 @@
           <p:nvPr/>
         </p:nvPicPr>
         <p:blipFill>
-          <a:blip r:embed="rId4">
+          <a:blip r:embed="rId3">
             <a:extLst>
               <a:ext uri="{28A0092B-C50C-407E-A947-70E740481C1C}">
                 <a14:useLocalDpi xmlns:a14="http://schemas.microsoft.com/office/drawing/2010/main" val="0"/>
@@ -8805,7 +8799,7 @@
         </p:blipFill>
         <p:spPr bwMode="auto">
           <a:xfrm>
-            <a:off x="8468131" y="5718017"/>
+            <a:off x="8472782" y="2215332"/>
             <a:ext cx="246554" cy="246554"/>
           </a:xfrm>
           <a:prstGeom prst="rect">
@@ -8832,7 +8826,7 @@
           <p:nvPr/>
         </p:nvPicPr>
         <p:blipFill>
-          <a:blip r:embed="rId4">
+          <a:blip r:embed="rId3">
             <a:extLst>
               <a:ext uri="{28A0092B-C50C-407E-A947-70E740481C1C}">
                 <a14:useLocalDpi xmlns:a14="http://schemas.microsoft.com/office/drawing/2010/main" val="0"/>
@@ -8846,7 +8840,7 @@
         </p:blipFill>
         <p:spPr bwMode="auto">
           <a:xfrm>
-            <a:off x="8469740" y="4231976"/>
+            <a:off x="8493803" y="4063528"/>
             <a:ext cx="246554" cy="246554"/>
           </a:xfrm>
           <a:prstGeom prst="rect">
@@ -8873,7 +8867,7 @@
           <p:nvPr/>
         </p:nvPicPr>
         <p:blipFill>
-          <a:blip r:embed="rId4">
+          <a:blip r:embed="rId3">
             <a:extLst>
               <a:ext uri="{28A0092B-C50C-407E-A947-70E740481C1C}">
                 <a14:useLocalDpi xmlns:a14="http://schemas.microsoft.com/office/drawing/2010/main" val="0"/>
@@ -8887,7 +8881,7 @@
         </p:blipFill>
         <p:spPr bwMode="auto">
           <a:xfrm>
-            <a:off x="8469740" y="3863385"/>
+            <a:off x="8493803" y="3694937"/>
             <a:ext cx="246554" cy="246554"/>
           </a:xfrm>
           <a:prstGeom prst="rect">
@@ -8914,7 +8908,7 @@
           <p:nvPr/>
         </p:nvPicPr>
         <p:blipFill>
-          <a:blip r:embed="rId4">
+          <a:blip r:embed="rId3">
             <a:extLst>
               <a:ext uri="{28A0092B-C50C-407E-A947-70E740481C1C}">
                 <a14:useLocalDpi xmlns:a14="http://schemas.microsoft.com/office/drawing/2010/main" val="0"/>
@@ -8928,7 +8922,7 @@
         </p:blipFill>
         <p:spPr bwMode="auto">
           <a:xfrm>
-            <a:off x="8468131" y="3123902"/>
+            <a:off x="8492194" y="2955454"/>
             <a:ext cx="246554" cy="246554"/>
           </a:xfrm>
           <a:prstGeom prst="rect">
@@ -8955,7 +8949,7 @@
           <p:nvPr/>
         </p:nvPicPr>
         <p:blipFill>
-          <a:blip r:embed="rId4">
+          <a:blip r:embed="rId3">
             <a:extLst>
               <a:ext uri="{28A0092B-C50C-407E-A947-70E740481C1C}">
                 <a14:useLocalDpi xmlns:a14="http://schemas.microsoft.com/office/drawing/2010/main" val="0"/>
@@ -8969,7 +8963,7 @@
         </p:blipFill>
         <p:spPr bwMode="auto">
           <a:xfrm>
-            <a:off x="8468131" y="3486072"/>
+            <a:off x="8492194" y="3317624"/>
             <a:ext cx="246554" cy="246554"/>
           </a:xfrm>
           <a:prstGeom prst="rect">
@@ -8996,7 +8990,7 @@
           <p:nvPr/>
         </p:nvPicPr>
         <p:blipFill>
-          <a:blip r:embed="rId4">
+          <a:blip r:embed="rId3">
             <a:extLst>
               <a:ext uri="{28A0092B-C50C-407E-A947-70E740481C1C}">
                 <a14:useLocalDpi xmlns:a14="http://schemas.microsoft.com/office/drawing/2010/main" val="0"/>
@@ -9010,7 +9004,7 @@
         </p:blipFill>
         <p:spPr bwMode="auto">
           <a:xfrm>
-            <a:off x="8468131" y="1257641"/>
+            <a:off x="8492194" y="1089193"/>
             <a:ext cx="246554" cy="246554"/>
           </a:xfrm>
           <a:prstGeom prst="rect">
@@ -9037,7 +9031,7 @@
           <p:nvPr/>
         </p:nvPicPr>
         <p:blipFill>
-          <a:blip r:embed="rId4">
+          <a:blip r:embed="rId3">
             <a:extLst>
               <a:ext uri="{28A0092B-C50C-407E-A947-70E740481C1C}">
                 <a14:useLocalDpi xmlns:a14="http://schemas.microsoft.com/office/drawing/2010/main" val="0"/>
@@ -9051,7 +9045,89 @@
         </p:blipFill>
         <p:spPr bwMode="auto">
           <a:xfrm>
-            <a:off x="8468131" y="4986219"/>
+            <a:off x="8492194" y="4817771"/>
+            <a:ext cx="246554" cy="246554"/>
+          </a:xfrm>
+          <a:prstGeom prst="rect">
+            <a:avLst/>
+          </a:prstGeom>
+          <a:noFill/>
+          <a:extLst>
+            <a:ext uri="{909E8E84-426E-40DD-AFC4-6F175D3DCCD1}">
+              <a14:hiddenFill xmlns:a14="http://schemas.microsoft.com/office/drawing/2010/main">
+                <a:solidFill>
+                  <a:srgbClr val="FFFFFF"/>
+                </a:solidFill>
+              </a14:hiddenFill>
+            </a:ext>
+          </a:extLst>
+        </p:spPr>
+      </p:pic>
+      <p:pic>
+        <p:nvPicPr>
+          <p:cNvPr id="18" name="Picture 2" descr="http://vitamin-c.vitamin-power.eu/assets/images/Gruener-Haken.jpg"/>
+          <p:cNvPicPr>
+            <a:picLocks noChangeAspect="1" noChangeArrowheads="1"/>
+          </p:cNvPicPr>
+          <p:nvPr/>
+        </p:nvPicPr>
+        <p:blipFill>
+          <a:blip r:embed="rId3">
+            <a:extLst>
+              <a:ext uri="{28A0092B-C50C-407E-A947-70E740481C1C}">
+                <a14:useLocalDpi xmlns:a14="http://schemas.microsoft.com/office/drawing/2010/main" val="0"/>
+              </a:ext>
+            </a:extLst>
+          </a:blip>
+          <a:srcRect/>
+          <a:stretch>
+            <a:fillRect/>
+          </a:stretch>
+        </p:blipFill>
+        <p:spPr bwMode="auto">
+          <a:xfrm>
+            <a:off x="8492194" y="5563760"/>
+            <a:ext cx="246554" cy="246554"/>
+          </a:xfrm>
+          <a:prstGeom prst="rect">
+            <a:avLst/>
+          </a:prstGeom>
+          <a:noFill/>
+          <a:extLst>
+            <a:ext uri="{909E8E84-426E-40DD-AFC4-6F175D3DCCD1}">
+              <a14:hiddenFill xmlns:a14="http://schemas.microsoft.com/office/drawing/2010/main">
+                <a:solidFill>
+                  <a:srgbClr val="FFFFFF"/>
+                </a:solidFill>
+              </a14:hiddenFill>
+            </a:ext>
+          </a:extLst>
+        </p:spPr>
+      </p:pic>
+      <p:pic>
+        <p:nvPicPr>
+          <p:cNvPr id="30" name="Picture 2" descr="http://vitamin-c.vitamin-power.eu/assets/images/Gruener-Haken.jpg"/>
+          <p:cNvPicPr>
+            <a:picLocks noChangeAspect="1" noChangeArrowheads="1"/>
+          </p:cNvPicPr>
+          <p:nvPr/>
+        </p:nvPicPr>
+        <p:blipFill>
+          <a:blip r:embed="rId3">
+            <a:extLst>
+              <a:ext uri="{28A0092B-C50C-407E-A947-70E740481C1C}">
+                <a14:useLocalDpi xmlns:a14="http://schemas.microsoft.com/office/drawing/2010/main" val="0"/>
+              </a:ext>
+            </a:extLst>
+          </a:blip>
+          <a:srcRect/>
+          <a:stretch>
+            <a:fillRect/>
+          </a:stretch>
+        </p:blipFill>
+        <p:spPr bwMode="auto">
+          <a:xfrm>
+            <a:off x="8492194" y="5922697"/>
             <a:ext cx="246554" cy="246554"/>
           </a:xfrm>
           <a:prstGeom prst="rect">

</xml_diff>